<commit_message>
minor ppt title changes
</commit_message>
<xml_diff>
--- a/Theory/Urban_Sound_Classification_ML_v2.pptx
+++ b/Theory/Urban_Sound_Classification_ML_v2.pptx
@@ -6706,17 +6706,6 @@
             <a:pPr marL="0" indent="0">
               <a:buNone/>
             </a:pPr>
-            <a:r>
-              <a:rPr lang="en-US" sz="1200" i="1" dirty="0">
-                <a:solidFill>
-                  <a:srgbClr val="64748B"/>
-                </a:solidFill>
-                <a:latin typeface="Calibri" pitchFamily="34" charset="0"/>
-                <a:ea typeface="Calibri" pitchFamily="34" charset="-122"/>
-                <a:cs typeface="Calibri" pitchFamily="34" charset="-120"/>
-              </a:rPr>
-              <a:t>(Example results - adjust based on your actual numbers)</a:t>
-            </a:r>
             <a:endParaRPr lang="en-US" sz="1200" dirty="0"/>
           </a:p>
         </p:txBody>
@@ -8603,17 +8592,6 @@
             <a:pPr marL="0" indent="0">
               <a:buNone/>
             </a:pPr>
-            <a:r>
-              <a:rPr lang="en-US" sz="1200" i="1" dirty="0">
-                <a:solidFill>
-                  <a:srgbClr val="64748B"/>
-                </a:solidFill>
-                <a:latin typeface="Calibri" pitchFamily="34" charset="0"/>
-                <a:ea typeface="Calibri" pitchFamily="34" charset="-122"/>
-                <a:cs typeface="Calibri" pitchFamily="34" charset="-120"/>
-              </a:rPr>
-              <a:t>(Example results - adjust based on your actual numbers)</a:t>
-            </a:r>
             <a:endParaRPr lang="en-US" sz="1200" dirty="0"/>
           </a:p>
         </p:txBody>
@@ -10517,7 +10495,7 @@
                 <a:ea typeface="Calibri" pitchFamily="34" charset="-122"/>
                 <a:cs typeface="Calibri" pitchFamily="34" charset="-120"/>
               </a:rPr>
-              <a:t>Protocol 2 shows ~10% higher accuracy than Protocol 1</a:t>
+              <a:t>Protocol 2 shows ~10-20% higher accuracy than Protocol 1</a:t>
             </a:r>
             <a:endParaRPr lang="en-US" sz="2000" dirty="0"/>
           </a:p>
@@ -10996,7 +10974,7 @@
                 <a:ea typeface="Calibri" pitchFamily="34" charset="-122"/>
                 <a:cs typeface="Calibri" pitchFamily="34" charset="-120"/>
               </a:rPr>
-              <a:t>For UrbanSound8K: Always use predefined folds. For your own data: Ensure test set comes from completely different sources/sessions/environments than training.</a:t>
+              <a:t>For UrbanSound8K: Always use predefined folds.</a:t>
             </a:r>
             <a:endParaRPr lang="en-US" sz="1100" dirty="0"/>
           </a:p>
@@ -12766,7 +12744,7 @@
                 <a:ea typeface="Calibri" pitchFamily="34" charset="-122"/>
                 <a:cs typeface="Calibri" pitchFamily="34" charset="-120"/>
               </a:rPr>
-              <a:t>XGBoost + handcrafted features: effective, efficient, reproducible approach</a:t>
+              <a:t>XGBoost + features tweak: effective, efficient, reproducible approach</a:t>
             </a:r>
             <a:endParaRPr lang="en-US" sz="1500" dirty="0"/>
           </a:p>

</xml_diff>